<commit_message>
Merge quiz-generation with develop branch (#1)
* Add quiz_generator file

* generalized file locations for pptx_to_xml.py

* final modifications to pptx_to_xml

* added comments to quiz_generator.py

* Add pptx_extraction

* Update to gitignore

* Add test file for pptx_extraction

* Change language on test ppt to english

* added cleaning methods to quiz_generator.py

* Add content page to test_1 ppt

* Completed simple quiz generator

* Minor changes

* Complete tests for extraction and quiz generation
</commit_message>
<xml_diff>
--- a/server/ppt_template/basic_ppt.pptx
+++ b/server/ppt_template/basic_ppt.pptx
@@ -246,7 +246,7 @@
           <a:p>
             <a:fld id="{CF554FB8-CFBF-1447-B37A-55068622EB0B}" type="datetimeFigureOut">
               <a:rPr lang="nb-NO" smtClean="0"/>
-              <a:t>15.02.2017</a:t>
+              <a:t>21.02.2017</a:t>
             </a:fld>
             <a:endParaRPr lang="nb-NO"/>
           </a:p>
@@ -416,7 +416,7 @@
           <a:p>
             <a:fld id="{CF554FB8-CFBF-1447-B37A-55068622EB0B}" type="datetimeFigureOut">
               <a:rPr lang="nb-NO" smtClean="0"/>
-              <a:t>15.02.2017</a:t>
+              <a:t>21.02.2017</a:t>
             </a:fld>
             <a:endParaRPr lang="nb-NO"/>
           </a:p>
@@ -596,7 +596,7 @@
           <a:p>
             <a:fld id="{CF554FB8-CFBF-1447-B37A-55068622EB0B}" type="datetimeFigureOut">
               <a:rPr lang="nb-NO" smtClean="0"/>
-              <a:t>15.02.2017</a:t>
+              <a:t>21.02.2017</a:t>
             </a:fld>
             <a:endParaRPr lang="nb-NO"/>
           </a:p>
@@ -766,7 +766,7 @@
           <a:p>
             <a:fld id="{CF554FB8-CFBF-1447-B37A-55068622EB0B}" type="datetimeFigureOut">
               <a:rPr lang="nb-NO" smtClean="0"/>
-              <a:t>15.02.2017</a:t>
+              <a:t>21.02.2017</a:t>
             </a:fld>
             <a:endParaRPr lang="nb-NO"/>
           </a:p>
@@ -1012,7 +1012,7 @@
           <a:p>
             <a:fld id="{CF554FB8-CFBF-1447-B37A-55068622EB0B}" type="datetimeFigureOut">
               <a:rPr lang="nb-NO" smtClean="0"/>
-              <a:t>15.02.2017</a:t>
+              <a:t>21.02.2017</a:t>
             </a:fld>
             <a:endParaRPr lang="nb-NO"/>
           </a:p>
@@ -1244,7 +1244,7 @@
           <a:p>
             <a:fld id="{CF554FB8-CFBF-1447-B37A-55068622EB0B}" type="datetimeFigureOut">
               <a:rPr lang="nb-NO" smtClean="0"/>
-              <a:t>15.02.2017</a:t>
+              <a:t>21.02.2017</a:t>
             </a:fld>
             <a:endParaRPr lang="nb-NO"/>
           </a:p>
@@ -1611,7 +1611,7 @@
           <a:p>
             <a:fld id="{CF554FB8-CFBF-1447-B37A-55068622EB0B}" type="datetimeFigureOut">
               <a:rPr lang="nb-NO" smtClean="0"/>
-              <a:t>15.02.2017</a:t>
+              <a:t>21.02.2017</a:t>
             </a:fld>
             <a:endParaRPr lang="nb-NO"/>
           </a:p>
@@ -1729,7 +1729,7 @@
           <a:p>
             <a:fld id="{CF554FB8-CFBF-1447-B37A-55068622EB0B}" type="datetimeFigureOut">
               <a:rPr lang="nb-NO" smtClean="0"/>
-              <a:t>15.02.2017</a:t>
+              <a:t>21.02.2017</a:t>
             </a:fld>
             <a:endParaRPr lang="nb-NO"/>
           </a:p>
@@ -1824,7 +1824,7 @@
           <a:p>
             <a:fld id="{CF554FB8-CFBF-1447-B37A-55068622EB0B}" type="datetimeFigureOut">
               <a:rPr lang="nb-NO" smtClean="0"/>
-              <a:t>15.02.2017</a:t>
+              <a:t>21.02.2017</a:t>
             </a:fld>
             <a:endParaRPr lang="nb-NO"/>
           </a:p>
@@ -2101,7 +2101,7 @@
           <a:p>
             <a:fld id="{CF554FB8-CFBF-1447-B37A-55068622EB0B}" type="datetimeFigureOut">
               <a:rPr lang="nb-NO" smtClean="0"/>
-              <a:t>15.02.2017</a:t>
+              <a:t>21.02.2017</a:t>
             </a:fld>
             <a:endParaRPr lang="nb-NO"/>
           </a:p>
@@ -2354,7 +2354,7 @@
           <a:p>
             <a:fld id="{CF554FB8-CFBF-1447-B37A-55068622EB0B}" type="datetimeFigureOut">
               <a:rPr lang="nb-NO" smtClean="0"/>
-              <a:t>15.02.2017</a:t>
+              <a:t>21.02.2017</a:t>
             </a:fld>
             <a:endParaRPr lang="nb-NO"/>
           </a:p>
@@ -2567,7 +2567,7 @@
           <a:p>
             <a:fld id="{CF554FB8-CFBF-1447-B37A-55068622EB0B}" type="datetimeFigureOut">
               <a:rPr lang="nb-NO" smtClean="0"/>
-              <a:t>15.02.2017</a:t>
+              <a:t>21.02.2017</a:t>
             </a:fld>
             <a:endParaRPr lang="nb-NO"/>
           </a:p>
@@ -3222,6 +3222,28 @@
             </a:r>
           </a:p>
           <a:p>
+            <a:pPr lvl="1"/>
+            <a:r>
+              <a:rPr lang="nb-NO" dirty="0" smtClean="0"/>
+              <a:t>Mye bedre enn en HDD</a:t>
+            </a:r>
+          </a:p>
+          <a:p>
+            <a:pPr lvl="1"/>
+            <a:r>
+              <a:rPr lang="nb-NO" dirty="0" smtClean="0"/>
+              <a:t>Raskere</a:t>
+            </a:r>
+          </a:p>
+          <a:p>
+            <a:pPr lvl="1"/>
+            <a:r>
+              <a:rPr lang="nb-NO" smtClean="0"/>
+              <a:t>Dyrere</a:t>
+            </a:r>
+            <a:endParaRPr lang="nb-NO" dirty="0" smtClean="0"/>
+          </a:p>
+          <a:p>
             <a:r>
               <a:rPr lang="nb-NO" dirty="0" smtClean="0"/>
               <a:t>CPU</a:t>

</xml_diff>